<commit_message>
HTML ilkin bilikler slayd elave edildi
</commit_message>
<xml_diff>
--- a/Fevral/27 - HTML MUH VE LAB2 TAPSİRİGİ/MUH HTML.pptx
+++ b/Fevral/27 - HTML MUH VE LAB2 TAPSİRİGİ/MUH HTML.pptx
@@ -22,6 +22,7 @@
     <p:sldId id="270" r:id="rId16"/>
     <p:sldId id="271" r:id="rId17"/>
     <p:sldId id="272" r:id="rId18"/>
+    <p:sldId id="273" r:id="rId19"/>
   </p:sldIdLst>
   <p:sldSz cx="12192000" cy="6858000"/>
   <p:notesSz cx="6858000" cy="9144000"/>
@@ -459,7 +460,7 @@
           <a:p>
             <a:fld id="{B2CD2A2A-11B4-4DDF-9C5B-AE4BC763C21A}" type="datetimeFigureOut">
               <a:rPr lang="en-US" smtClean="0"/>
-              <a:t>24-Nov-23</a:t>
+              <a:t>28-Feb-24</a:t>
             </a:fld>
             <a:endParaRPr lang="en-US"/>
           </a:p>
@@ -783,7 +784,7 @@
           <a:p>
             <a:fld id="{B2CD2A2A-11B4-4DDF-9C5B-AE4BC763C21A}" type="datetimeFigureOut">
               <a:rPr lang="en-US" smtClean="0"/>
-              <a:t>24-Nov-23</a:t>
+              <a:t>28-Feb-24</a:t>
             </a:fld>
             <a:endParaRPr lang="en-US"/>
           </a:p>
@@ -1031,7 +1032,7 @@
           <a:p>
             <a:fld id="{B2CD2A2A-11B4-4DDF-9C5B-AE4BC763C21A}" type="datetimeFigureOut">
               <a:rPr lang="en-US" smtClean="0"/>
-              <a:t>24-Nov-23</a:t>
+              <a:t>28-Feb-24</a:t>
             </a:fld>
             <a:endParaRPr lang="en-US"/>
           </a:p>
@@ -1370,7 +1371,7 @@
           <a:p>
             <a:fld id="{B2CD2A2A-11B4-4DDF-9C5B-AE4BC763C21A}" type="datetimeFigureOut">
               <a:rPr lang="en-US" smtClean="0"/>
-              <a:t>24-Nov-23</a:t>
+              <a:t>28-Feb-24</a:t>
             </a:fld>
             <a:endParaRPr lang="en-US"/>
           </a:p>
@@ -1717,7 +1718,7 @@
           <a:p>
             <a:fld id="{B2CD2A2A-11B4-4DDF-9C5B-AE4BC763C21A}" type="datetimeFigureOut">
               <a:rPr lang="en-US" smtClean="0"/>
-              <a:t>24-Nov-23</a:t>
+              <a:t>28-Feb-24</a:t>
             </a:fld>
             <a:endParaRPr lang="en-US"/>
           </a:p>
@@ -2091,7 +2092,7 @@
           <a:p>
             <a:fld id="{B2CD2A2A-11B4-4DDF-9C5B-AE4BC763C21A}" type="datetimeFigureOut">
               <a:rPr lang="en-US" smtClean="0"/>
-              <a:t>24-Nov-23</a:t>
+              <a:t>28-Feb-24</a:t>
             </a:fld>
             <a:endParaRPr lang="en-US"/>
           </a:p>
@@ -2561,7 +2562,7 @@
           <a:p>
             <a:fld id="{B2CD2A2A-11B4-4DDF-9C5B-AE4BC763C21A}" type="datetimeFigureOut">
               <a:rPr lang="en-US" smtClean="0"/>
-              <a:t>24-Nov-23</a:t>
+              <a:t>28-Feb-24</a:t>
             </a:fld>
             <a:endParaRPr lang="en-US"/>
           </a:p>
@@ -2766,7 +2767,7 @@
           <a:p>
             <a:fld id="{B2CD2A2A-11B4-4DDF-9C5B-AE4BC763C21A}" type="datetimeFigureOut">
               <a:rPr lang="en-US" smtClean="0"/>
-              <a:t>24-Nov-23</a:t>
+              <a:t>28-Feb-24</a:t>
             </a:fld>
             <a:endParaRPr lang="en-US"/>
           </a:p>
@@ -2977,7 +2978,7 @@
           <a:p>
             <a:fld id="{B2CD2A2A-11B4-4DDF-9C5B-AE4BC763C21A}" type="datetimeFigureOut">
               <a:rPr lang="en-US" smtClean="0"/>
-              <a:t>24-Nov-23</a:t>
+              <a:t>28-Feb-24</a:t>
             </a:fld>
             <a:endParaRPr lang="en-US"/>
           </a:p>
@@ -3209,7 +3210,7 @@
           <a:p>
             <a:fld id="{B2CD2A2A-11B4-4DDF-9C5B-AE4BC763C21A}" type="datetimeFigureOut">
               <a:rPr lang="en-US" smtClean="0"/>
-              <a:t>24-Nov-23</a:t>
+              <a:t>28-Feb-24</a:t>
             </a:fld>
             <a:endParaRPr lang="en-US"/>
           </a:p>
@@ -3457,7 +3458,7 @@
           <a:p>
             <a:fld id="{B2CD2A2A-11B4-4DDF-9C5B-AE4BC763C21A}" type="datetimeFigureOut">
               <a:rPr lang="en-US" smtClean="0"/>
-              <a:t>24-Nov-23</a:t>
+              <a:t>28-Feb-24</a:t>
             </a:fld>
             <a:endParaRPr lang="en-US"/>
           </a:p>
@@ -3755,7 +3756,7 @@
           <a:p>
             <a:fld id="{B2CD2A2A-11B4-4DDF-9C5B-AE4BC763C21A}" type="datetimeFigureOut">
               <a:rPr lang="en-US" smtClean="0"/>
-              <a:t>24-Nov-23</a:t>
+              <a:t>28-Feb-24</a:t>
             </a:fld>
             <a:endParaRPr lang="en-US"/>
           </a:p>
@@ -4149,7 +4150,7 @@
           <a:p>
             <a:fld id="{B2CD2A2A-11B4-4DDF-9C5B-AE4BC763C21A}" type="datetimeFigureOut">
               <a:rPr lang="en-US" smtClean="0"/>
-              <a:t>24-Nov-23</a:t>
+              <a:t>28-Feb-24</a:t>
             </a:fld>
             <a:endParaRPr lang="en-US"/>
           </a:p>
@@ -4298,7 +4299,7 @@
           <a:p>
             <a:fld id="{B2CD2A2A-11B4-4DDF-9C5B-AE4BC763C21A}" type="datetimeFigureOut">
               <a:rPr lang="en-US" smtClean="0"/>
-              <a:t>24-Nov-23</a:t>
+              <a:t>28-Feb-24</a:t>
             </a:fld>
             <a:endParaRPr lang="en-US"/>
           </a:p>
@@ -4424,7 +4425,7 @@
           <a:p>
             <a:fld id="{B2CD2A2A-11B4-4DDF-9C5B-AE4BC763C21A}" type="datetimeFigureOut">
               <a:rPr lang="en-US" smtClean="0"/>
-              <a:t>24-Nov-23</a:t>
+              <a:t>28-Feb-24</a:t>
             </a:fld>
             <a:endParaRPr lang="en-US"/>
           </a:p>
@@ -4679,7 +4680,7 @@
           <a:p>
             <a:fld id="{B2CD2A2A-11B4-4DDF-9C5B-AE4BC763C21A}" type="datetimeFigureOut">
               <a:rPr lang="en-US" smtClean="0"/>
-              <a:t>24-Nov-23</a:t>
+              <a:t>28-Feb-24</a:t>
             </a:fld>
             <a:endParaRPr lang="en-US"/>
           </a:p>
@@ -4994,7 +4995,7 @@
           <a:p>
             <a:fld id="{B2CD2A2A-11B4-4DDF-9C5B-AE4BC763C21A}" type="datetimeFigureOut">
               <a:rPr lang="en-US" smtClean="0"/>
-              <a:t>24-Nov-23</a:t>
+              <a:t>28-Feb-24</a:t>
             </a:fld>
             <a:endParaRPr lang="en-US"/>
           </a:p>
@@ -5345,7 +5346,7 @@
           <a:p>
             <a:fld id="{B2CD2A2A-11B4-4DDF-9C5B-AE4BC763C21A}" type="datetimeFigureOut">
               <a:rPr lang="en-US" smtClean="0"/>
-              <a:t>24-Nov-23</a:t>
+              <a:t>28-Feb-24</a:t>
             </a:fld>
             <a:endParaRPr lang="en-US"/>
           </a:p>
@@ -9224,6 +9225,200 @@
 </p:sld>
 </file>
 
+<file path=ppt/slides/slide18.xml><?xml version="1.0" encoding="utf-8"?>
+<p:sld xmlns:a="http://schemas.openxmlformats.org/drawingml/2006/main" xmlns:r="http://schemas.openxmlformats.org/officeDocument/2006/relationships" xmlns:p="http://schemas.openxmlformats.org/presentationml/2006/main">
+  <p:cSld>
+    <p:spTree>
+      <p:nvGrpSpPr>
+        <p:cNvPr id="1" name=""/>
+        <p:cNvGrpSpPr/>
+        <p:nvPr/>
+      </p:nvGrpSpPr>
+      <p:grpSpPr>
+        <a:xfrm>
+          <a:off x="0" y="0"/>
+          <a:ext cx="0" cy="0"/>
+          <a:chOff x="0" y="0"/>
+          <a:chExt cx="0" cy="0"/>
+        </a:xfrm>
+      </p:grpSpPr>
+      <p:sp>
+        <p:nvSpPr>
+          <p:cNvPr id="2" name="Title 1">
+            <a:extLst>
+              <a:ext uri="{FF2B5EF4-FFF2-40B4-BE49-F238E27FC236}">
+                <a16:creationId xmlns:a16="http://schemas.microsoft.com/office/drawing/2014/main" id="{E798B421-8ECD-4C75-BC09-DB07A643929E}"/>
+              </a:ext>
+            </a:extLst>
+          </p:cNvPr>
+          <p:cNvSpPr>
+            <a:spLocks noGrp="1"/>
+          </p:cNvSpPr>
+          <p:nvPr>
+            <p:ph type="title"/>
+          </p:nvPr>
+        </p:nvSpPr>
+        <p:spPr>
+          <a:xfrm>
+            <a:off x="1028702" y="330198"/>
+            <a:ext cx="9601196" cy="1303867"/>
+          </a:xfrm>
+        </p:spPr>
+        <p:txBody>
+          <a:bodyPr/>
+          <a:lstStyle/>
+          <a:p>
+            <a:r>
+              <a:rPr lang="en-US" dirty="0" err="1"/>
+              <a:t>Laboratoriya</a:t>
+            </a:r>
+            <a:r>
+              <a:rPr lang="en-US" dirty="0"/>
+              <a:t> -2</a:t>
+            </a:r>
+          </a:p>
+        </p:txBody>
+      </p:sp>
+      <p:sp>
+        <p:nvSpPr>
+          <p:cNvPr id="3" name="Content Placeholder 2">
+            <a:extLst>
+              <a:ext uri="{FF2B5EF4-FFF2-40B4-BE49-F238E27FC236}">
+                <a16:creationId xmlns:a16="http://schemas.microsoft.com/office/drawing/2014/main" id="{0596ABDB-24AC-45E2-B6D0-B56697A23BB5}"/>
+              </a:ext>
+            </a:extLst>
+          </p:cNvPr>
+          <p:cNvSpPr>
+            <a:spLocks noGrp="1"/>
+          </p:cNvSpPr>
+          <p:nvPr>
+            <p:ph idx="1"/>
+          </p:nvPr>
+        </p:nvSpPr>
+        <p:spPr>
+          <a:xfrm>
+            <a:off x="1295401" y="1634065"/>
+            <a:ext cx="9601196" cy="5008035"/>
+          </a:xfrm>
+        </p:spPr>
+        <p:txBody>
+          <a:bodyPr>
+            <a:normAutofit/>
+          </a:bodyPr>
+          <a:lstStyle/>
+          <a:p>
+            <a:r>
+              <a:rPr lang="az-Latn-AZ" sz="3200" dirty="0"/>
+              <a:t>1. Fevral/27 qovluğunda </a:t>
+            </a:r>
+            <a:r>
+              <a:rPr lang="az-Latn-AZ" sz="3200" b="1" dirty="0"/>
+              <a:t>html</a:t>
+            </a:r>
+            <a:r>
+              <a:rPr lang="az-Latn-AZ" sz="3200" dirty="0"/>
+              <a:t> faylı yaradın</a:t>
+            </a:r>
+          </a:p>
+          <a:p>
+            <a:r>
+              <a:rPr lang="az-Latn-AZ" sz="3200" dirty="0"/>
+              <a:t>2. Başlıq yaradın (</a:t>
+            </a:r>
+            <a:r>
+              <a:rPr lang="en-US" sz="3200" dirty="0"/>
+              <a:t>&lt;h1&gt; </a:t>
+            </a:r>
+            <a:r>
+              <a:rPr lang="en-US" sz="3200" dirty="0" err="1"/>
+              <a:t>yaxud</a:t>
+            </a:r>
+            <a:r>
+              <a:rPr lang="en-US" sz="3200" dirty="0"/>
+              <a:t> &lt;h2&gt;</a:t>
+            </a:r>
+            <a:r>
+              <a:rPr lang="az-Latn-AZ" sz="3200" dirty="0"/>
+              <a:t>Laboratoriya 2)</a:t>
+            </a:r>
+          </a:p>
+          <a:p>
+            <a:r>
+              <a:rPr lang="en-US" sz="3200" dirty="0"/>
+              <a:t>&lt;</a:t>
+            </a:r>
+            <a:r>
+              <a:rPr lang="en-US" sz="3200" dirty="0" err="1"/>
+              <a:t>br</a:t>
+            </a:r>
+            <a:r>
+              <a:rPr lang="en-US" sz="3200" dirty="0"/>
+              <a:t>&gt;</a:t>
+            </a:r>
+            <a:endParaRPr lang="az-Latn-AZ" sz="3200" dirty="0"/>
+          </a:p>
+          <a:p>
+            <a:r>
+              <a:rPr lang="az-Latn-AZ" sz="3200" dirty="0"/>
+              <a:t>3. Paraqraf əlavə edin (Ad Soyad)</a:t>
+            </a:r>
+            <a:endParaRPr lang="en-US" sz="3200" dirty="0"/>
+          </a:p>
+          <a:p>
+            <a:r>
+              <a:rPr lang="en-US" sz="3200" dirty="0"/>
+              <a:t>4. </a:t>
+            </a:r>
+            <a:r>
+              <a:rPr lang="az-Latn-AZ" sz="3200" dirty="0"/>
+              <a:t>L</a:t>
+            </a:r>
+            <a:r>
+              <a:rPr lang="en-US" sz="3200" dirty="0"/>
+              <a:t>ink </a:t>
+            </a:r>
+            <a:r>
+              <a:rPr lang="az-Latn-AZ" sz="3200" dirty="0"/>
+              <a:t>əlavə edin (Github hesabınızın linki)</a:t>
+            </a:r>
+            <a:endParaRPr lang="en-US" sz="3200" dirty="0"/>
+          </a:p>
+          <a:p>
+            <a:r>
+              <a:rPr lang="en-US" sz="3200" dirty="0"/>
+              <a:t>5. &lt;</a:t>
+            </a:r>
+            <a:r>
+              <a:rPr lang="en-US" sz="3200" dirty="0" err="1"/>
+              <a:t>br</a:t>
+            </a:r>
+            <a:r>
+              <a:rPr lang="en-US" sz="3200" dirty="0"/>
+              <a:t>&gt;</a:t>
+            </a:r>
+          </a:p>
+          <a:p>
+            <a:r>
+              <a:rPr lang="az-Latn-AZ" sz="3200" dirty="0"/>
+              <a:t>6. Şəkil əlavə edin (online resursdan)</a:t>
+            </a:r>
+            <a:endParaRPr lang="en-US" sz="3200" dirty="0"/>
+          </a:p>
+        </p:txBody>
+      </p:sp>
+    </p:spTree>
+    <p:extLst>
+      <p:ext uri="{BB962C8B-B14F-4D97-AF65-F5344CB8AC3E}">
+        <p14:creationId xmlns:p14="http://schemas.microsoft.com/office/powerpoint/2010/main" val="119204019"/>
+      </p:ext>
+    </p:extLst>
+  </p:cSld>
+  <p:clrMapOvr>
+    <a:masterClrMapping/>
+  </p:clrMapOvr>
+</p:sld>
+</file>
+
 <file path=ppt/slides/slide2.xml><?xml version="1.0" encoding="utf-8"?>
 <p:sld xmlns:a="http://schemas.openxmlformats.org/drawingml/2006/main" xmlns:r="http://schemas.openxmlformats.org/officeDocument/2006/relationships" xmlns:p="http://schemas.openxmlformats.org/presentationml/2006/main">
   <p:cSld>

</xml_diff>